<commit_message>
Refactor format of paper and some graphics
</commit_message>
<xml_diff>
--- a/paper/images/systemArchitecture.pptx
+++ b/paper/images/systemArchitecture.pptx
@@ -104,6 +104,22 @@
       </a:defRPr>
     </a:lvl9pPr>
   </p:defaultTextStyle>
+  <p:extLst>
+    <p:ext uri="{EFAFB233-063F-42B5-8137-9DF3F51BA10A}">
+      <p15:sldGuideLst xmlns:p15="http://schemas.microsoft.com/office/powerpoint/2012/main">
+        <p15:guide id="1" orient="horz" pos="2160">
+          <p15:clr>
+            <a:srgbClr val="A4A3A4"/>
+          </p15:clr>
+        </p15:guide>
+        <p15:guide id="2" pos="2880">
+          <p15:clr>
+            <a:srgbClr val="A4A3A4"/>
+          </p15:clr>
+        </p15:guide>
+      </p15:sldGuideLst>
+    </p:ext>
+  </p:extLst>
 </p:presentation>
 </file>
 
@@ -289,7 +305,7 @@
             <a:fld id="{CD66EB5A-4F37-441C-A97C-356D4BF20A1B}" type="datetimeFigureOut">
               <a:rPr lang="de-DE" smtClean="0"/>
               <a:pPr/>
-              <a:t>22/06/14</a:t>
+              <a:t>14.12.16</a:t>
             </a:fld>
             <a:endParaRPr lang="de-DE"/>
           </a:p>
@@ -332,7 +348,7 @@
             <a:fld id="{DF8402F8-FF20-44EF-9D70-5A7001AC350C}" type="slidenum">
               <a:rPr lang="de-DE" smtClean="0"/>
               <a:pPr/>
-              <a:t>‹Nr.›</a:t>
+              <a:t>‹#›</a:t>
             </a:fld>
             <a:endParaRPr lang="de-DE"/>
           </a:p>
@@ -456,7 +472,7 @@
             <a:fld id="{CD66EB5A-4F37-441C-A97C-356D4BF20A1B}" type="datetimeFigureOut">
               <a:rPr lang="de-DE" smtClean="0"/>
               <a:pPr/>
-              <a:t>22/06/14</a:t>
+              <a:t>14.12.16</a:t>
             </a:fld>
             <a:endParaRPr lang="de-DE"/>
           </a:p>
@@ -499,7 +515,7 @@
             <a:fld id="{DF8402F8-FF20-44EF-9D70-5A7001AC350C}" type="slidenum">
               <a:rPr lang="de-DE" smtClean="0"/>
               <a:pPr/>
-              <a:t>‹Nr.›</a:t>
+              <a:t>‹#›</a:t>
             </a:fld>
             <a:endParaRPr lang="de-DE"/>
           </a:p>
@@ -633,7 +649,7 @@
             <a:fld id="{CD66EB5A-4F37-441C-A97C-356D4BF20A1B}" type="datetimeFigureOut">
               <a:rPr lang="de-DE" smtClean="0"/>
               <a:pPr/>
-              <a:t>22/06/14</a:t>
+              <a:t>14.12.16</a:t>
             </a:fld>
             <a:endParaRPr lang="de-DE"/>
           </a:p>
@@ -676,7 +692,7 @@
             <a:fld id="{DF8402F8-FF20-44EF-9D70-5A7001AC350C}" type="slidenum">
               <a:rPr lang="de-DE" smtClean="0"/>
               <a:pPr/>
-              <a:t>‹Nr.›</a:t>
+              <a:t>‹#›</a:t>
             </a:fld>
             <a:endParaRPr lang="de-DE"/>
           </a:p>
@@ -800,7 +816,7 @@
             <a:fld id="{CD66EB5A-4F37-441C-A97C-356D4BF20A1B}" type="datetimeFigureOut">
               <a:rPr lang="de-DE" smtClean="0"/>
               <a:pPr/>
-              <a:t>22/06/14</a:t>
+              <a:t>14.12.16</a:t>
             </a:fld>
             <a:endParaRPr lang="de-DE"/>
           </a:p>
@@ -843,7 +859,7 @@
             <a:fld id="{DF8402F8-FF20-44EF-9D70-5A7001AC350C}" type="slidenum">
               <a:rPr lang="de-DE" smtClean="0"/>
               <a:pPr/>
-              <a:t>‹Nr.›</a:t>
+              <a:t>‹#›</a:t>
             </a:fld>
             <a:endParaRPr lang="de-DE"/>
           </a:p>
@@ -1043,7 +1059,7 @@
             <a:fld id="{CD66EB5A-4F37-441C-A97C-356D4BF20A1B}" type="datetimeFigureOut">
               <a:rPr lang="de-DE" smtClean="0"/>
               <a:pPr/>
-              <a:t>22/06/14</a:t>
+              <a:t>14.12.16</a:t>
             </a:fld>
             <a:endParaRPr lang="de-DE"/>
           </a:p>
@@ -1086,7 +1102,7 @@
             <a:fld id="{DF8402F8-FF20-44EF-9D70-5A7001AC350C}" type="slidenum">
               <a:rPr lang="de-DE" smtClean="0"/>
               <a:pPr/>
-              <a:t>‹Nr.›</a:t>
+              <a:t>‹#›</a:t>
             </a:fld>
             <a:endParaRPr lang="de-DE"/>
           </a:p>
@@ -1328,7 +1344,7 @@
             <a:fld id="{CD66EB5A-4F37-441C-A97C-356D4BF20A1B}" type="datetimeFigureOut">
               <a:rPr lang="de-DE" smtClean="0"/>
               <a:pPr/>
-              <a:t>22/06/14</a:t>
+              <a:t>14.12.16</a:t>
             </a:fld>
             <a:endParaRPr lang="de-DE"/>
           </a:p>
@@ -1371,7 +1387,7 @@
             <a:fld id="{DF8402F8-FF20-44EF-9D70-5A7001AC350C}" type="slidenum">
               <a:rPr lang="de-DE" smtClean="0"/>
               <a:pPr/>
-              <a:t>‹Nr.›</a:t>
+              <a:t>‹#›</a:t>
             </a:fld>
             <a:endParaRPr lang="de-DE"/>
           </a:p>
@@ -1747,7 +1763,7 @@
             <a:fld id="{CD66EB5A-4F37-441C-A97C-356D4BF20A1B}" type="datetimeFigureOut">
               <a:rPr lang="de-DE" smtClean="0"/>
               <a:pPr/>
-              <a:t>22/06/14</a:t>
+              <a:t>14.12.16</a:t>
             </a:fld>
             <a:endParaRPr lang="de-DE"/>
           </a:p>
@@ -1790,7 +1806,7 @@
             <a:fld id="{DF8402F8-FF20-44EF-9D70-5A7001AC350C}" type="slidenum">
               <a:rPr lang="de-DE" smtClean="0"/>
               <a:pPr/>
-              <a:t>‹Nr.›</a:t>
+              <a:t>‹#›</a:t>
             </a:fld>
             <a:endParaRPr lang="de-DE"/>
           </a:p>
@@ -1862,7 +1878,7 @@
             <a:fld id="{CD66EB5A-4F37-441C-A97C-356D4BF20A1B}" type="datetimeFigureOut">
               <a:rPr lang="de-DE" smtClean="0"/>
               <a:pPr/>
-              <a:t>22/06/14</a:t>
+              <a:t>14.12.16</a:t>
             </a:fld>
             <a:endParaRPr lang="de-DE"/>
           </a:p>
@@ -1905,7 +1921,7 @@
             <a:fld id="{DF8402F8-FF20-44EF-9D70-5A7001AC350C}" type="slidenum">
               <a:rPr lang="de-DE" smtClean="0"/>
               <a:pPr/>
-              <a:t>‹Nr.›</a:t>
+              <a:t>‹#›</a:t>
             </a:fld>
             <a:endParaRPr lang="de-DE"/>
           </a:p>
@@ -1954,7 +1970,7 @@
             <a:fld id="{CD66EB5A-4F37-441C-A97C-356D4BF20A1B}" type="datetimeFigureOut">
               <a:rPr lang="de-DE" smtClean="0"/>
               <a:pPr/>
-              <a:t>22/06/14</a:t>
+              <a:t>14.12.16</a:t>
             </a:fld>
             <a:endParaRPr lang="de-DE"/>
           </a:p>
@@ -1997,7 +2013,7 @@
             <a:fld id="{DF8402F8-FF20-44EF-9D70-5A7001AC350C}" type="slidenum">
               <a:rPr lang="de-DE" smtClean="0"/>
               <a:pPr/>
-              <a:t>‹Nr.›</a:t>
+              <a:t>‹#›</a:t>
             </a:fld>
             <a:endParaRPr lang="de-DE"/>
           </a:p>
@@ -2228,7 +2244,7 @@
             <a:fld id="{CD66EB5A-4F37-441C-A97C-356D4BF20A1B}" type="datetimeFigureOut">
               <a:rPr lang="de-DE" smtClean="0"/>
               <a:pPr/>
-              <a:t>22/06/14</a:t>
+              <a:t>14.12.16</a:t>
             </a:fld>
             <a:endParaRPr lang="de-DE"/>
           </a:p>
@@ -2271,7 +2287,7 @@
             <a:fld id="{DF8402F8-FF20-44EF-9D70-5A7001AC350C}" type="slidenum">
               <a:rPr lang="de-DE" smtClean="0"/>
               <a:pPr/>
-              <a:t>‹Nr.›</a:t>
+              <a:t>‹#›</a:t>
             </a:fld>
             <a:endParaRPr lang="de-DE"/>
           </a:p>
@@ -2478,7 +2494,7 @@
             <a:fld id="{CD66EB5A-4F37-441C-A97C-356D4BF20A1B}" type="datetimeFigureOut">
               <a:rPr lang="de-DE" smtClean="0"/>
               <a:pPr/>
-              <a:t>22/06/14</a:t>
+              <a:t>14.12.16</a:t>
             </a:fld>
             <a:endParaRPr lang="de-DE"/>
           </a:p>
@@ -2521,7 +2537,7 @@
             <a:fld id="{DF8402F8-FF20-44EF-9D70-5A7001AC350C}" type="slidenum">
               <a:rPr lang="de-DE" smtClean="0"/>
               <a:pPr/>
-              <a:t>‹Nr.›</a:t>
+              <a:t>‹#›</a:t>
             </a:fld>
             <a:endParaRPr lang="de-DE"/>
           </a:p>
@@ -2688,7 +2704,7 @@
             <a:fld id="{CD66EB5A-4F37-441C-A97C-356D4BF20A1B}" type="datetimeFigureOut">
               <a:rPr lang="de-DE" smtClean="0"/>
               <a:pPr/>
-              <a:t>22/06/14</a:t>
+              <a:t>14.12.16</a:t>
             </a:fld>
             <a:endParaRPr lang="de-DE"/>
           </a:p>
@@ -2767,7 +2783,7 @@
             <a:fld id="{DF8402F8-FF20-44EF-9D70-5A7001AC350C}" type="slidenum">
               <a:rPr lang="de-DE" smtClean="0"/>
               <a:pPr/>
-              <a:t>‹Nr.›</a:t>
+              <a:t>‹#›</a:t>
             </a:fld>
             <a:endParaRPr lang="de-DE"/>
           </a:p>
@@ -3068,7 +3084,7 @@
         <p:spPr>
           <a:xfrm>
             <a:off x="2483768" y="476672"/>
-            <a:ext cx="5040560" cy="2376264"/>
+            <a:ext cx="5040560" cy="1872208"/>
           </a:xfrm>
           <a:prstGeom prst="roundRect">
             <a:avLst/>
@@ -3130,8 +3146,8 @@
         </p:nvSpPr>
         <p:spPr>
           <a:xfrm>
-            <a:off x="2483768" y="3068960"/>
-            <a:ext cx="5040560" cy="1800200"/>
+            <a:off x="2483768" y="2420888"/>
+            <a:ext cx="5040560" cy="1309700"/>
           </a:xfrm>
           <a:prstGeom prst="roundRect">
             <a:avLst/>
@@ -3193,8 +3209,8 @@
         </p:nvSpPr>
         <p:spPr>
           <a:xfrm>
-            <a:off x="2483768" y="5085184"/>
-            <a:ext cx="5040560" cy="1512168"/>
+            <a:off x="2483768" y="3789040"/>
+            <a:ext cx="5040560" cy="877652"/>
           </a:xfrm>
           <a:prstGeom prst="roundRect">
             <a:avLst/>
@@ -3263,8 +3279,8 @@
         </p:nvSpPr>
         <p:spPr>
           <a:xfrm>
-            <a:off x="2627784" y="5661248"/>
-            <a:ext cx="1440160" cy="792088"/>
+            <a:off x="2627784" y="4221088"/>
+            <a:ext cx="1440160" cy="373596"/>
           </a:xfrm>
           <a:prstGeom prst="roundRect">
             <a:avLst/>
@@ -3325,20 +3341,6 @@
               </a:rPr>
               <a:t>Local</a:t>
             </a:r>
-            <a:r>
-              <a:rPr lang="de-DE" dirty="0" smtClean="0">
-                <a:latin typeface="Times New Roman"/>
-                <a:cs typeface="Times New Roman"/>
-              </a:rPr>
-              <a:t> </a:t>
-            </a:r>
-            <a:r>
-              <a:rPr lang="de-DE" dirty="0" err="1" smtClean="0">
-                <a:latin typeface="Times New Roman"/>
-                <a:cs typeface="Times New Roman"/>
-              </a:rPr>
-              <a:t>Execution</a:t>
-            </a:r>
             <a:endParaRPr lang="de-DE" dirty="0">
               <a:latin typeface="Times New Roman"/>
               <a:cs typeface="Times New Roman"/>
@@ -3354,8 +3356,8 @@
         </p:nvSpPr>
         <p:spPr>
           <a:xfrm>
-            <a:off x="4283968" y="5661248"/>
-            <a:ext cx="1440160" cy="792088"/>
+            <a:off x="4254684" y="4221088"/>
+            <a:ext cx="1440160" cy="373596"/>
           </a:xfrm>
           <a:prstGeom prst="roundRect">
             <a:avLst/>
@@ -3414,7 +3416,7 @@
                 <a:latin typeface="Times New Roman"/>
                 <a:cs typeface="Times New Roman"/>
               </a:rPr>
-              <a:t>Stratosphere</a:t>
+              <a:t>Flink</a:t>
             </a:r>
             <a:endParaRPr lang="de-DE" dirty="0">
               <a:latin typeface="Times New Roman"/>
@@ -3431,8 +3433,8 @@
         </p:nvSpPr>
         <p:spPr>
           <a:xfrm>
-            <a:off x="5940152" y="5661248"/>
-            <a:ext cx="1440160" cy="792088"/>
+            <a:off x="5889506" y="4221088"/>
+            <a:ext cx="1440160" cy="373596"/>
           </a:xfrm>
           <a:prstGeom prst="roundRect">
             <a:avLst/>
@@ -3508,8 +3510,8 @@
         </p:nvSpPr>
         <p:spPr>
           <a:xfrm>
-            <a:off x="2627784" y="4221088"/>
-            <a:ext cx="4752528" cy="432048"/>
+            <a:off x="2627784" y="3298540"/>
+            <a:ext cx="4752528" cy="360000"/>
           </a:xfrm>
           <a:prstGeom prst="roundRect">
             <a:avLst/>
@@ -3592,8 +3594,8 @@
         </p:nvSpPr>
         <p:spPr>
           <a:xfrm>
-            <a:off x="2627784" y="1052736"/>
-            <a:ext cx="4752528" cy="432048"/>
+            <a:off x="2627784" y="980768"/>
+            <a:ext cx="4752528" cy="360000"/>
           </a:xfrm>
           <a:prstGeom prst="roundRect">
             <a:avLst/>
@@ -3683,8 +3685,8 @@
         </p:nvSpPr>
         <p:spPr>
           <a:xfrm>
-            <a:off x="2627784" y="1628800"/>
-            <a:ext cx="4752528" cy="432048"/>
+            <a:off x="2627784" y="1412776"/>
+            <a:ext cx="4752528" cy="360000"/>
           </a:xfrm>
           <a:prstGeom prst="roundRect">
             <a:avLst/>
@@ -3760,8 +3762,8 @@
         </p:nvSpPr>
         <p:spPr>
           <a:xfrm>
-            <a:off x="2627784" y="2204864"/>
-            <a:ext cx="4752528" cy="432048"/>
+            <a:off x="2627784" y="1844824"/>
+            <a:ext cx="4752528" cy="360000"/>
           </a:xfrm>
           <a:prstGeom prst="roundRect">
             <a:avLst/>
@@ -3837,8 +3839,8 @@
         </p:nvSpPr>
         <p:spPr>
           <a:xfrm>
-            <a:off x="2627784" y="3645024"/>
-            <a:ext cx="4752528" cy="432048"/>
+            <a:off x="2627784" y="2866532"/>
+            <a:ext cx="4752528" cy="360000"/>
           </a:xfrm>
           <a:prstGeom prst="roundRect">
             <a:avLst/>

</xml_diff>